<commit_message>
Updte to slide 3 of presentation
</commit_message>
<xml_diff>
--- a/Learning.pptx
+++ b/Learning.pptx
@@ -292,7 +292,7 @@
           <a:p>
             <a:fld id="{57F4B050-F664-4BAD-B23B-2141B24439E8}" type="datetimeFigureOut">
               <a:rPr lang="en-GB" smtClean="0"/>
-              <a:t>22/11/2016</a:t>
+              <a:t>24/11/2016</a:t>
             </a:fld>
             <a:endParaRPr lang="en-GB"/>
           </a:p>
@@ -462,7 +462,7 @@
           <a:p>
             <a:fld id="{57F4B050-F664-4BAD-B23B-2141B24439E8}" type="datetimeFigureOut">
               <a:rPr lang="en-GB" smtClean="0"/>
-              <a:t>22/11/2016</a:t>
+              <a:t>24/11/2016</a:t>
             </a:fld>
             <a:endParaRPr lang="en-GB"/>
           </a:p>
@@ -642,7 +642,7 @@
           <a:p>
             <a:fld id="{57F4B050-F664-4BAD-B23B-2141B24439E8}" type="datetimeFigureOut">
               <a:rPr lang="en-GB" smtClean="0"/>
-              <a:t>22/11/2016</a:t>
+              <a:t>24/11/2016</a:t>
             </a:fld>
             <a:endParaRPr lang="en-GB"/>
           </a:p>
@@ -812,7 +812,7 @@
           <a:p>
             <a:fld id="{57F4B050-F664-4BAD-B23B-2141B24439E8}" type="datetimeFigureOut">
               <a:rPr lang="en-GB" smtClean="0"/>
-              <a:t>22/11/2016</a:t>
+              <a:t>24/11/2016</a:t>
             </a:fld>
             <a:endParaRPr lang="en-GB"/>
           </a:p>
@@ -1058,7 +1058,7 @@
           <a:p>
             <a:fld id="{57F4B050-F664-4BAD-B23B-2141B24439E8}" type="datetimeFigureOut">
               <a:rPr lang="en-GB" smtClean="0"/>
-              <a:t>22/11/2016</a:t>
+              <a:t>24/11/2016</a:t>
             </a:fld>
             <a:endParaRPr lang="en-GB"/>
           </a:p>
@@ -1346,7 +1346,7 @@
           <a:p>
             <a:fld id="{57F4B050-F664-4BAD-B23B-2141B24439E8}" type="datetimeFigureOut">
               <a:rPr lang="en-GB" smtClean="0"/>
-              <a:t>22/11/2016</a:t>
+              <a:t>24/11/2016</a:t>
             </a:fld>
             <a:endParaRPr lang="en-GB"/>
           </a:p>
@@ -1768,7 +1768,7 @@
           <a:p>
             <a:fld id="{57F4B050-F664-4BAD-B23B-2141B24439E8}" type="datetimeFigureOut">
               <a:rPr lang="en-GB" smtClean="0"/>
-              <a:t>22/11/2016</a:t>
+              <a:t>24/11/2016</a:t>
             </a:fld>
             <a:endParaRPr lang="en-GB"/>
           </a:p>
@@ -1886,7 +1886,7 @@
           <a:p>
             <a:fld id="{57F4B050-F664-4BAD-B23B-2141B24439E8}" type="datetimeFigureOut">
               <a:rPr lang="en-GB" smtClean="0"/>
-              <a:t>22/11/2016</a:t>
+              <a:t>24/11/2016</a:t>
             </a:fld>
             <a:endParaRPr lang="en-GB"/>
           </a:p>
@@ -1981,7 +1981,7 @@
           <a:p>
             <a:fld id="{57F4B050-F664-4BAD-B23B-2141B24439E8}" type="datetimeFigureOut">
               <a:rPr lang="en-GB" smtClean="0"/>
-              <a:t>22/11/2016</a:t>
+              <a:t>24/11/2016</a:t>
             </a:fld>
             <a:endParaRPr lang="en-GB"/>
           </a:p>
@@ -2258,7 +2258,7 @@
           <a:p>
             <a:fld id="{57F4B050-F664-4BAD-B23B-2141B24439E8}" type="datetimeFigureOut">
               <a:rPr lang="en-GB" smtClean="0"/>
-              <a:t>22/11/2016</a:t>
+              <a:t>24/11/2016</a:t>
             </a:fld>
             <a:endParaRPr lang="en-GB"/>
           </a:p>
@@ -2511,7 +2511,7 @@
           <a:p>
             <a:fld id="{57F4B050-F664-4BAD-B23B-2141B24439E8}" type="datetimeFigureOut">
               <a:rPr lang="en-GB" smtClean="0"/>
-              <a:t>22/11/2016</a:t>
+              <a:t>24/11/2016</a:t>
             </a:fld>
             <a:endParaRPr lang="en-GB"/>
           </a:p>
@@ -2724,7 +2724,7 @@
           <a:p>
             <a:fld id="{57F4B050-F664-4BAD-B23B-2141B24439E8}" type="datetimeFigureOut">
               <a:rPr lang="en-GB" smtClean="0"/>
-              <a:t>22/11/2016</a:t>
+              <a:t>24/11/2016</a:t>
             </a:fld>
             <a:endParaRPr lang="en-GB"/>
           </a:p>
@@ -3611,12 +3611,123 @@
             <p:ph sz="half" idx="2"/>
           </p:nvPr>
         </p:nvSpPr>
-        <p:spPr/>
-        <p:txBody>
-          <a:bodyPr/>
-          <a:lstStyle/>
-          <a:p>
-            <a:endParaRPr lang="en-GB"/>
+        <p:spPr>
+          <a:xfrm>
+            <a:off x="1259632" y="1637952"/>
+            <a:ext cx="6552728" cy="4599360"/>
+          </a:xfrm>
+        </p:spPr>
+        <p:txBody>
+          <a:bodyPr>
+            <a:normAutofit/>
+          </a:bodyPr>
+          <a:lstStyle/>
+          <a:p>
+            <a:r>
+              <a:rPr lang="en-GB" sz="1600" dirty="0" err="1" smtClean="0"/>
+              <a:t>edX</a:t>
+            </a:r>
+            <a:endParaRPr lang="en-GB" sz="1600" dirty="0" smtClean="0"/>
+          </a:p>
+          <a:p>
+            <a:pPr lvl="1"/>
+            <a:r>
+              <a:rPr lang="en-GB" sz="1600" dirty="0" smtClean="0"/>
+              <a:t>Feels a bit like the OU.  Free, unless certification sought.</a:t>
+            </a:r>
+          </a:p>
+          <a:p>
+            <a:r>
+              <a:rPr lang="en-GB" sz="1600" dirty="0" err="1" smtClean="0"/>
+              <a:t>tuts</a:t>
+            </a:r>
+            <a:r>
+              <a:rPr lang="en-GB" sz="1600" dirty="0"/>
+              <a:t>+ </a:t>
+            </a:r>
+            <a:r>
+              <a:rPr lang="en-GB" sz="1600" dirty="0" smtClean="0"/>
+              <a:t>premium</a:t>
+            </a:r>
+          </a:p>
+          <a:p>
+            <a:pPr lvl="1"/>
+            <a:r>
+              <a:rPr lang="en-GB" sz="1600" dirty="0" smtClean="0"/>
+              <a:t>Reviews were a bit mixed, and support was very sketchy.</a:t>
+            </a:r>
+            <a:endParaRPr lang="en-GB" sz="1600" dirty="0"/>
+          </a:p>
+          <a:p>
+            <a:r>
+              <a:rPr lang="en-GB" sz="1600" dirty="0" err="1" smtClean="0"/>
+              <a:t>Udacity</a:t>
+            </a:r>
+            <a:endParaRPr lang="en-GB" sz="1600" dirty="0" smtClean="0"/>
+          </a:p>
+          <a:p>
+            <a:pPr lvl="1"/>
+            <a:r>
+              <a:rPr lang="en-GB" sz="1600" dirty="0" smtClean="0"/>
+              <a:t>Felt a little too full on, for what I wanted.  I was looking to enjoy!</a:t>
+            </a:r>
+            <a:endParaRPr lang="en-GB" sz="1600" dirty="0"/>
+          </a:p>
+          <a:p>
+            <a:r>
+              <a:rPr lang="en-GB" sz="1600" dirty="0"/>
+              <a:t>Code </a:t>
+            </a:r>
+            <a:r>
+              <a:rPr lang="en-GB" sz="1600" dirty="0" smtClean="0"/>
+              <a:t>School (winner)</a:t>
+            </a:r>
+          </a:p>
+          <a:p>
+            <a:pPr lvl="1"/>
+            <a:r>
+              <a:rPr lang="en-GB" sz="1600" dirty="0" smtClean="0"/>
+              <a:t>The clear winner for me.  First class reviews, targeting topics I was interested in.  Published reviews suggested this was the best choice for experienced developers (harder exercises).</a:t>
+            </a:r>
+          </a:p>
+          <a:p>
+            <a:r>
+              <a:rPr lang="en-GB" sz="1600" dirty="0" smtClean="0"/>
+              <a:t>Code </a:t>
+            </a:r>
+            <a:r>
+              <a:rPr lang="en-GB" sz="1600" dirty="0" err="1" smtClean="0"/>
+              <a:t>Cademy</a:t>
+            </a:r>
+            <a:r>
+              <a:rPr lang="en-GB" sz="1600" dirty="0" smtClean="0"/>
+              <a:t> (</a:t>
+            </a:r>
+            <a:r>
+              <a:rPr lang="en-GB" sz="1600" dirty="0" smtClean="0"/>
+              <a:t>runner-up</a:t>
+            </a:r>
+            <a:r>
+              <a:rPr lang="en-GB" sz="1600" dirty="0" smtClean="0"/>
+              <a:t>)</a:t>
+            </a:r>
+          </a:p>
+          <a:p>
+            <a:pPr lvl="1"/>
+            <a:r>
+              <a:rPr lang="en-GB" sz="1600" dirty="0" smtClean="0"/>
+              <a:t>Very, very similar to Code School, but targeting less experienced developers. I found reported errors on tutorials less informing. Criticised for “copy and paste” from the lectures.</a:t>
+            </a:r>
+            <a:endParaRPr lang="en-GB" dirty="0" smtClean="0"/>
+          </a:p>
+          <a:p>
+            <a:endParaRPr lang="en-GB" dirty="0" smtClean="0"/>
+          </a:p>
+          <a:p>
+            <a:endParaRPr lang="en-GB" dirty="0"/>
+          </a:p>
+          <a:p>
+            <a:endParaRPr lang="en-GB" dirty="0"/>
           </a:p>
         </p:txBody>
       </p:sp>

</xml_diff>